<commit_message>
Added demonstration of progress presentation. Created tiles.
</commit_message>
<xml_diff>
--- a/Demonstration of Progress/DofP_Presentation.pptx
+++ b/Demonstration of Progress/DofP_Presentation.pptx
@@ -111,6 +111,11 @@
       </a:defRPr>
     </a:lvl9pPr>
   </p:defaultTextStyle>
+  <p:extLst>
+    <p:ext uri="{EFAFB233-063F-42B5-8137-9DF3F51BA10A}">
+      <p15:sldGuideLst xmlns:p15="http://schemas.microsoft.com/office/powerpoint/2012/main"/>
+    </p:ext>
+  </p:extLst>
 </p:presentation>
 </file>
 
@@ -196,7 +201,7 @@
           <a:p>
             <a:fld id="{323CEBFE-5E34-FF48-B247-1C7835D14F32}" type="datetimeFigureOut">
               <a:rPr lang="en-US" smtClean="0"/>
-              <a:t>2/18/19</a:t>
+              <a:t>2/23/19</a:t>
             </a:fld>
             <a:endParaRPr lang="en-US"/>
           </a:p>
@@ -694,7 +699,7 @@
           <a:p>
             <a:fld id="{6C034539-F425-1A4F-8757-58B01ED7ADA0}" type="datetimeFigureOut">
               <a:rPr lang="en-US" smtClean="0"/>
-              <a:t>2/18/19</a:t>
+              <a:t>2/23/19</a:t>
             </a:fld>
             <a:endParaRPr lang="en-US"/>
           </a:p>
@@ -892,7 +897,7 @@
           <a:p>
             <a:fld id="{6C034539-F425-1A4F-8757-58B01ED7ADA0}" type="datetimeFigureOut">
               <a:rPr lang="en-US" smtClean="0"/>
-              <a:t>2/18/19</a:t>
+              <a:t>2/23/19</a:t>
             </a:fld>
             <a:endParaRPr lang="en-US"/>
           </a:p>
@@ -1100,7 +1105,7 @@
           <a:p>
             <a:fld id="{6C034539-F425-1A4F-8757-58B01ED7ADA0}" type="datetimeFigureOut">
               <a:rPr lang="en-US" smtClean="0"/>
-              <a:t>2/18/19</a:t>
+              <a:t>2/23/19</a:t>
             </a:fld>
             <a:endParaRPr lang="en-US"/>
           </a:p>
@@ -1298,7 +1303,7 @@
           <a:p>
             <a:fld id="{6C034539-F425-1A4F-8757-58B01ED7ADA0}" type="datetimeFigureOut">
               <a:rPr lang="en-US" smtClean="0"/>
-              <a:t>2/18/19</a:t>
+              <a:t>2/23/19</a:t>
             </a:fld>
             <a:endParaRPr lang="en-US"/>
           </a:p>
@@ -1573,7 +1578,7 @@
           <a:p>
             <a:fld id="{6C034539-F425-1A4F-8757-58B01ED7ADA0}" type="datetimeFigureOut">
               <a:rPr lang="en-US" smtClean="0"/>
-              <a:t>2/18/19</a:t>
+              <a:t>2/23/19</a:t>
             </a:fld>
             <a:endParaRPr lang="en-US"/>
           </a:p>
@@ -1838,7 +1843,7 @@
           <a:p>
             <a:fld id="{6C034539-F425-1A4F-8757-58B01ED7ADA0}" type="datetimeFigureOut">
               <a:rPr lang="en-US" smtClean="0"/>
-              <a:t>2/18/19</a:t>
+              <a:t>2/23/19</a:t>
             </a:fld>
             <a:endParaRPr lang="en-US"/>
           </a:p>
@@ -2250,7 +2255,7 @@
           <a:p>
             <a:fld id="{6C034539-F425-1A4F-8757-58B01ED7ADA0}" type="datetimeFigureOut">
               <a:rPr lang="en-US" smtClean="0"/>
-              <a:t>2/18/19</a:t>
+              <a:t>2/23/19</a:t>
             </a:fld>
             <a:endParaRPr lang="en-US"/>
           </a:p>
@@ -2391,7 +2396,7 @@
           <a:p>
             <a:fld id="{6C034539-F425-1A4F-8757-58B01ED7ADA0}" type="datetimeFigureOut">
               <a:rPr lang="en-US" smtClean="0"/>
-              <a:t>2/18/19</a:t>
+              <a:t>2/23/19</a:t>
             </a:fld>
             <a:endParaRPr lang="en-US"/>
           </a:p>
@@ -2504,7 +2509,7 @@
           <a:p>
             <a:fld id="{6C034539-F425-1A4F-8757-58B01ED7ADA0}" type="datetimeFigureOut">
               <a:rPr lang="en-US" smtClean="0"/>
-              <a:t>2/18/19</a:t>
+              <a:t>2/23/19</a:t>
             </a:fld>
             <a:endParaRPr lang="en-US"/>
           </a:p>
@@ -2815,7 +2820,7 @@
           <a:p>
             <a:fld id="{6C034539-F425-1A4F-8757-58B01ED7ADA0}" type="datetimeFigureOut">
               <a:rPr lang="en-US" smtClean="0"/>
-              <a:t>2/18/19</a:t>
+              <a:t>2/23/19</a:t>
             </a:fld>
             <a:endParaRPr lang="en-US"/>
           </a:p>
@@ -3103,7 +3108,7 @@
           <a:p>
             <a:fld id="{6C034539-F425-1A4F-8757-58B01ED7ADA0}" type="datetimeFigureOut">
               <a:rPr lang="en-US" smtClean="0"/>
-              <a:t>2/18/19</a:t>
+              <a:t>2/23/19</a:t>
             </a:fld>
             <a:endParaRPr lang="en-US"/>
           </a:p>
@@ -3344,7 +3349,7 @@
           <a:p>
             <a:fld id="{6C034539-F425-1A4F-8757-58B01ED7ADA0}" type="datetimeFigureOut">
               <a:rPr lang="en-US" smtClean="0"/>
-              <a:t>2/18/19</a:t>
+              <a:t>2/23/19</a:t>
             </a:fld>
             <a:endParaRPr lang="en-US"/>
           </a:p>

</xml_diff>